<commit_message>
end of day Monday 8.17
</commit_message>
<xml_diff>
--- a/Presentation/Spotify Presentation.pptx
+++ b/Presentation/Spotify Presentation.pptx
@@ -4749,7 +4749,10 @@
           </a:bodyPr>
           <a:lstStyle/>
           <a:p>
-            <a:endParaRPr lang="en-US" dirty="0"/>
+            <a:r>
+              <a:rPr lang="en-US" dirty="0"/>
+              <a:t>Links with resources for pitching your music to the Spotify content curators</a:t>
+            </a:r>
           </a:p>
         </p:txBody>
       </p:sp>
@@ -5642,13 +5645,13 @@
           <a:p>
             <a:r>
               <a:rPr lang="en-US" dirty="0"/>
-              <a:t>Genre Recommended Songs: For each of the x number of listed genres, the 100 most popular recommended songs along with several metadata categories was compiled</a:t>
-            </a:r>
-          </a:p>
-          <a:p>
-            <a:r>
-              <a:rPr lang="en-US" dirty="0"/>
-              <a:t>Category Playlists: For each of the x number of categories, all the playlists were compiled along with several metadata categories</a:t>
+              <a:t>Genre Recommended Songs: For each of the 122 listed genres, the 100 most popular recommended songs along with several metadata categories was compiled</a:t>
+            </a:r>
+          </a:p>
+          <a:p>
+            <a:r>
+              <a:rPr lang="en-US" dirty="0"/>
+              <a:t>Category Playlists: For each of the 51categories, all the playlists were compiled along with several metadata categories (over 1000 different playlists)</a:t>
             </a:r>
           </a:p>
           <a:p>

</xml_diff>